<commit_message>
Tilføjet lidt noter til min del
</commit_message>
<xml_diff>
--- a/Præsentation.pptx
+++ b/Præsentation.pptx
@@ -119,6 +119,11 @@
       </a:defRPr>
     </a:lvl9pPr>
   </p:defaultTextStyle>
+  <p:extLst>
+    <p:ext uri="{EFAFB233-063F-42B5-8137-9DF3F51BA10A}">
+      <p15:sldGuideLst xmlns:p15="http://schemas.microsoft.com/office/powerpoint/2012/main"/>
+    </p:ext>
+  </p:extLst>
 </p:presentation>
 </file>
 
@@ -641,6 +646,298 @@
 </file>
 
 <file path=ppt/notesSlides/notesSlide3.xml><?xml version="1.0" encoding="utf-8"?>
+<p:notes xmlns:a="http://schemas.openxmlformats.org/drawingml/2006/main" xmlns:r="http://schemas.openxmlformats.org/officeDocument/2006/relationships" xmlns:p="http://schemas.openxmlformats.org/presentationml/2006/main">
+  <p:cSld>
+    <p:spTree>
+      <p:nvGrpSpPr>
+        <p:cNvPr id="1" name=""/>
+        <p:cNvGrpSpPr/>
+        <p:nvPr/>
+      </p:nvGrpSpPr>
+      <p:grpSpPr>
+        <a:xfrm>
+          <a:off x="0" y="0"/>
+          <a:ext cx="0" cy="0"/>
+          <a:chOff x="0" y="0"/>
+          <a:chExt cx="0" cy="0"/>
+        </a:xfrm>
+      </p:grpSpPr>
+      <p:sp>
+        <p:nvSpPr>
+          <p:cNvPr id="2" name="Pladsholder til slidebillede 1"/>
+          <p:cNvSpPr>
+            <a:spLocks noGrp="1" noRot="1" noChangeAspect="1"/>
+          </p:cNvSpPr>
+          <p:nvPr>
+            <p:ph type="sldImg"/>
+          </p:nvPr>
+        </p:nvSpPr>
+        <p:spPr/>
+      </p:sp>
+      <p:sp>
+        <p:nvSpPr>
+          <p:cNvPr id="3" name="Pladsholder til noter 2"/>
+          <p:cNvSpPr>
+            <a:spLocks noGrp="1"/>
+          </p:cNvSpPr>
+          <p:nvPr>
+            <p:ph type="body" idx="1"/>
+          </p:nvPr>
+        </p:nvSpPr>
+        <p:spPr/>
+        <p:txBody>
+          <a:bodyPr/>
+          <a:lstStyle/>
+          <a:p>
+            <a:r>
+              <a:rPr lang="da-DK" dirty="0" smtClean="0"/>
+              <a:t>Generelt</a:t>
+            </a:r>
+            <a:r>
+              <a:rPr lang="da-DK" baseline="0" dirty="0" smtClean="0"/>
+              <a:t> om Data </a:t>
+            </a:r>
+            <a:r>
+              <a:rPr lang="da-DK" baseline="0" dirty="0" err="1" smtClean="0"/>
+              <a:t>View</a:t>
+            </a:r>
+            <a:endParaRPr lang="da-DK" baseline="0" dirty="0" smtClean="0"/>
+          </a:p>
+          <a:p>
+            <a:r>
+              <a:rPr lang="da-DK" baseline="0" dirty="0" smtClean="0"/>
+              <a:t>Hvorfor har vi valgt at bruge EF</a:t>
+            </a:r>
+          </a:p>
+          <a:p>
+            <a:r>
+              <a:rPr lang="da-DK" baseline="0" dirty="0" smtClean="0"/>
+              <a:t>	- Brugte først ADO.NET, men efter undervisning i EF </a:t>
+            </a:r>
+            <a:r>
+              <a:rPr lang="da-DK" baseline="0" dirty="0" err="1" smtClean="0"/>
+              <a:t>refaktorerede</a:t>
+            </a:r>
+            <a:r>
+              <a:rPr lang="da-DK" baseline="0" dirty="0" smtClean="0"/>
+              <a:t> vi systemet</a:t>
+            </a:r>
+          </a:p>
+          <a:p>
+            <a:r>
+              <a:rPr lang="da-DK" baseline="0" dirty="0" smtClean="0"/>
+              <a:t>Diagrammet</a:t>
+            </a:r>
+          </a:p>
+          <a:p>
+            <a:r>
+              <a:rPr lang="da-DK" baseline="0" dirty="0" smtClean="0"/>
+              <a:t>	- Strukturen i databasen</a:t>
+            </a:r>
+          </a:p>
+          <a:p>
+            <a:r>
+              <a:rPr lang="da-DK" baseline="0" dirty="0" smtClean="0"/>
+              <a:t>	- Vi startede med Quiz, </a:t>
+            </a:r>
+            <a:r>
+              <a:rPr lang="da-DK" baseline="0" dirty="0" err="1" smtClean="0"/>
+              <a:t>Question</a:t>
+            </a:r>
+            <a:r>
+              <a:rPr lang="da-DK" baseline="0" dirty="0" smtClean="0"/>
+              <a:t>, </a:t>
+            </a:r>
+            <a:r>
+              <a:rPr lang="da-DK" baseline="0" dirty="0" err="1" smtClean="0"/>
+              <a:t>Answer</a:t>
+            </a:r>
+            <a:r>
+              <a:rPr lang="da-DK" baseline="0" dirty="0" smtClean="0"/>
+              <a:t> og Tags</a:t>
+            </a:r>
+          </a:p>
+        </p:txBody>
+      </p:sp>
+      <p:sp>
+        <p:nvSpPr>
+          <p:cNvPr id="4" name="Pladsholder til slidenummer 3"/>
+          <p:cNvSpPr>
+            <a:spLocks noGrp="1"/>
+          </p:cNvSpPr>
+          <p:nvPr>
+            <p:ph type="sldNum" sz="quarter" idx="10"/>
+          </p:nvPr>
+        </p:nvSpPr>
+        <p:spPr/>
+        <p:txBody>
+          <a:bodyPr/>
+          <a:lstStyle/>
+          <a:p>
+            <a:fld id="{3126B5D0-05C2-4D34-AE76-1997AB998A84}" type="slidenum">
+              <a:rPr lang="en-US" smtClean="0"/>
+              <a:t>5</a:t>
+            </a:fld>
+            <a:endParaRPr lang="en-US"/>
+          </a:p>
+        </p:txBody>
+      </p:sp>
+    </p:spTree>
+    <p:extLst>
+      <p:ext uri="{BB962C8B-B14F-4D97-AF65-F5344CB8AC3E}">
+        <p14:creationId xmlns:p14="http://schemas.microsoft.com/office/powerpoint/2010/main" val="3601458665"/>
+      </p:ext>
+    </p:extLst>
+  </p:cSld>
+  <p:clrMapOvr>
+    <a:masterClrMapping/>
+  </p:clrMapOvr>
+</p:notes>
+</file>
+
+<file path=ppt/notesSlides/notesSlide4.xml><?xml version="1.0" encoding="utf-8"?>
+<p:notes xmlns:a="http://schemas.openxmlformats.org/drawingml/2006/main" xmlns:r="http://schemas.openxmlformats.org/officeDocument/2006/relationships" xmlns:p="http://schemas.openxmlformats.org/presentationml/2006/main">
+  <p:cSld>
+    <p:spTree>
+      <p:nvGrpSpPr>
+        <p:cNvPr id="1" name=""/>
+        <p:cNvGrpSpPr/>
+        <p:nvPr/>
+      </p:nvGrpSpPr>
+      <p:grpSpPr>
+        <a:xfrm>
+          <a:off x="0" y="0"/>
+          <a:ext cx="0" cy="0"/>
+          <a:chOff x="0" y="0"/>
+          <a:chExt cx="0" cy="0"/>
+        </a:xfrm>
+      </p:grpSpPr>
+      <p:sp>
+        <p:nvSpPr>
+          <p:cNvPr id="2" name="Pladsholder til slidebillede 1"/>
+          <p:cNvSpPr>
+            <a:spLocks noGrp="1" noRot="1" noChangeAspect="1"/>
+          </p:cNvSpPr>
+          <p:nvPr>
+            <p:ph type="sldImg"/>
+          </p:nvPr>
+        </p:nvSpPr>
+        <p:spPr/>
+      </p:sp>
+      <p:sp>
+        <p:nvSpPr>
+          <p:cNvPr id="3" name="Pladsholder til noter 2"/>
+          <p:cNvSpPr>
+            <a:spLocks noGrp="1"/>
+          </p:cNvSpPr>
+          <p:nvPr>
+            <p:ph type="body" idx="1"/>
+          </p:nvPr>
+        </p:nvSpPr>
+        <p:spPr/>
+        <p:txBody>
+          <a:bodyPr/>
+          <a:lstStyle/>
+          <a:p>
+            <a:r>
+              <a:rPr lang="da-DK" dirty="0" smtClean="0"/>
+              <a:t>Deployment </a:t>
+            </a:r>
+            <a:r>
+              <a:rPr lang="da-DK" dirty="0" err="1" smtClean="0"/>
+              <a:t>View</a:t>
+            </a:r>
+            <a:endParaRPr lang="da-DK" dirty="0" smtClean="0"/>
+          </a:p>
+          <a:p>
+            <a:r>
+              <a:rPr lang="da-DK" dirty="0" smtClean="0"/>
+              <a:t>	-</a:t>
+            </a:r>
+            <a:r>
+              <a:rPr lang="da-DK" baseline="0" dirty="0" smtClean="0"/>
+              <a:t> Hvilke enheder er vores system </a:t>
+            </a:r>
+            <a:r>
+              <a:rPr lang="da-DK" baseline="0" dirty="0" err="1" smtClean="0"/>
+              <a:t>deployet</a:t>
+            </a:r>
+            <a:r>
+              <a:rPr lang="da-DK" baseline="0" dirty="0" smtClean="0"/>
+              <a:t> på</a:t>
+            </a:r>
+          </a:p>
+          <a:p>
+            <a:r>
+              <a:rPr lang="da-DK" baseline="0" dirty="0" smtClean="0"/>
+              <a:t>	- Hvad er kommunikationen mellem dem (protokol)</a:t>
+            </a:r>
+            <a:endParaRPr lang="da-DK" dirty="0" smtClean="0"/>
+          </a:p>
+          <a:p>
+            <a:r>
+              <a:rPr lang="da-DK" dirty="0" smtClean="0"/>
+              <a:t>3-tier arkitektur</a:t>
+            </a:r>
+          </a:p>
+          <a:p>
+            <a:r>
+              <a:rPr lang="da-DK" dirty="0" smtClean="0"/>
+              <a:t>	- Typisk 3-tier</a:t>
+            </a:r>
+            <a:r>
+              <a:rPr lang="da-DK" baseline="0" dirty="0" smtClean="0"/>
+              <a:t> model, med </a:t>
+            </a:r>
+            <a:r>
+              <a:rPr lang="da-DK" baseline="0" dirty="0" err="1" smtClean="0"/>
+              <a:t>client</a:t>
+            </a:r>
+            <a:r>
+              <a:rPr lang="da-DK" baseline="0" dirty="0" smtClean="0"/>
+              <a:t>, webserver og databaseserver</a:t>
+            </a:r>
+            <a:endParaRPr lang="en-US" dirty="0"/>
+          </a:p>
+        </p:txBody>
+      </p:sp>
+      <p:sp>
+        <p:nvSpPr>
+          <p:cNvPr id="4" name="Pladsholder til slidenummer 3"/>
+          <p:cNvSpPr>
+            <a:spLocks noGrp="1"/>
+          </p:cNvSpPr>
+          <p:nvPr>
+            <p:ph type="sldNum" sz="quarter" idx="10"/>
+          </p:nvPr>
+        </p:nvSpPr>
+        <p:spPr/>
+        <p:txBody>
+          <a:bodyPr/>
+          <a:lstStyle/>
+          <a:p>
+            <a:fld id="{3126B5D0-05C2-4D34-AE76-1997AB998A84}" type="slidenum">
+              <a:rPr lang="en-US" smtClean="0"/>
+              <a:t>6</a:t>
+            </a:fld>
+            <a:endParaRPr lang="en-US"/>
+          </a:p>
+        </p:txBody>
+      </p:sp>
+    </p:spTree>
+    <p:extLst>
+      <p:ext uri="{BB962C8B-B14F-4D97-AF65-F5344CB8AC3E}">
+        <p14:creationId xmlns:p14="http://schemas.microsoft.com/office/powerpoint/2010/main" val="3604660076"/>
+      </p:ext>
+    </p:extLst>
+  </p:cSld>
+  <p:clrMapOvr>
+    <a:masterClrMapping/>
+  </p:clrMapOvr>
+</p:notes>
+</file>
+
+<file path=ppt/notesSlides/notesSlide5.xml><?xml version="1.0" encoding="utf-8"?>
 <p:notes xmlns:a="http://schemas.openxmlformats.org/drawingml/2006/main" xmlns:r="http://schemas.openxmlformats.org/officeDocument/2006/relationships" xmlns:p="http://schemas.openxmlformats.org/presentationml/2006/main">
   <p:cSld>
     <p:spTree>
@@ -5525,7 +5822,7 @@
           <p:nvPr/>
         </p:nvPicPr>
         <p:blipFill>
-          <a:blip r:embed="rId2"/>
+          <a:blip r:embed="rId3"/>
           <a:stretch>
             <a:fillRect/>
           </a:stretch>
@@ -5724,7 +6021,7 @@
           <p:nvPr/>
         </p:nvPicPr>
         <p:blipFill>
-          <a:blip r:embed="rId2"/>
+          <a:blip r:embed="rId3"/>
           <a:stretch>
             <a:fillRect/>
           </a:stretch>

</xml_diff>

<commit_message>
Noter til Lars' del + Thumbs.db?????
</commit_message>
<xml_diff>
--- a/Præsentation.pptx
+++ b/Præsentation.pptx
@@ -209,7 +209,7 @@
           <a:p>
             <a:fld id="{C71685AB-BE54-4650-9FF2-755B60E472F8}" type="datetimeFigureOut">
               <a:rPr lang="en-US" smtClean="0"/>
-              <a:t>29-Jun-15</a:t>
+              <a:t>6/29/2015</a:t>
             </a:fld>
             <a:endParaRPr lang="en-US"/>
           </a:p>
@@ -983,6 +983,290 @@
           <a:p>
             <a:r>
               <a:rPr lang="da-DK" dirty="0" smtClean="0"/>
+              <a:t>Brugt elementer fra </a:t>
+            </a:r>
+            <a:r>
+              <a:rPr lang="da-DK" b="1" dirty="0" smtClean="0"/>
+              <a:t>SCRUM</a:t>
+            </a:r>
+            <a:r>
+              <a:rPr lang="da-DK" dirty="0" smtClean="0"/>
+              <a:t> til at håndtere</a:t>
+            </a:r>
+            <a:r>
+              <a:rPr lang="da-DK" baseline="0" dirty="0" smtClean="0"/>
+              <a:t> den agile arbejdsproces. Vil gerne ligge fokus på Sprints, og hvordan vi har brugt dem i arbejdsprocessen:</a:t>
+            </a:r>
+          </a:p>
+          <a:p>
+            <a:r>
+              <a:rPr lang="da-DK" baseline="0" dirty="0" smtClean="0"/>
+              <a:t> </a:t>
+            </a:r>
+          </a:p>
+          <a:p>
+            <a:r>
+              <a:rPr lang="da-DK" baseline="0" dirty="0" smtClean="0"/>
+              <a:t>- Brugt til at arbejde iterativt i de forskellige </a:t>
+            </a:r>
+            <a:r>
+              <a:rPr lang="da-DK" baseline="0" dirty="0" err="1" smtClean="0"/>
+              <a:t>iterationer</a:t>
+            </a:r>
+            <a:r>
+              <a:rPr lang="da-DK" baseline="0" dirty="0" smtClean="0"/>
+              <a:t>. Målet med </a:t>
+            </a:r>
+            <a:r>
+              <a:rPr lang="da-DK" baseline="0" dirty="0" err="1" smtClean="0"/>
+              <a:t>iterationerne</a:t>
+            </a:r>
+            <a:r>
+              <a:rPr lang="da-DK" baseline="0" dirty="0" smtClean="0"/>
+              <a:t> er at have et færdigt produkt – målet i sprints var løbende at implementere dele af dette produkt.</a:t>
+            </a:r>
+          </a:p>
+          <a:p>
+            <a:endParaRPr lang="da-DK" baseline="0" dirty="0" smtClean="0"/>
+          </a:p>
+          <a:p>
+            <a:r>
+              <a:rPr lang="da-DK" baseline="0" dirty="0" smtClean="0"/>
+              <a:t>Brugt Redmines SCRUM </a:t>
+            </a:r>
+            <a:r>
+              <a:rPr lang="da-DK" baseline="0" dirty="0" err="1" smtClean="0"/>
+              <a:t>board</a:t>
+            </a:r>
+            <a:r>
+              <a:rPr lang="da-DK" baseline="0" dirty="0" smtClean="0"/>
+              <a:t> med arbejdsopgaver – denne har ændret sig i løbet af projektet. </a:t>
+            </a:r>
+          </a:p>
+          <a:p>
+            <a:pPr marL="171450" indent="-171450">
+              <a:buFontTx/>
+              <a:buChar char="-"/>
+            </a:pPr>
+            <a:r>
+              <a:rPr lang="da-DK" baseline="0" dirty="0" smtClean="0"/>
+              <a:t>Først oprettede vi alle opgaver, og det var </a:t>
+            </a:r>
+            <a:r>
+              <a:rPr lang="da-DK" b="1" baseline="0" dirty="0" smtClean="0"/>
+              <a:t>folks eget ansvar </a:t>
+            </a:r>
+            <a:r>
+              <a:rPr lang="da-DK" baseline="0" dirty="0" smtClean="0"/>
+              <a:t>for at tage nok til at vi blev færdige. Dårlig synergi mellem opgaver: ”Kan jeg tage den her, når jeg ikke ved hvad GUY laver? Det hænger meget sammen….”, ikke alle opgaver blev færdiggjort.</a:t>
+            </a:r>
+          </a:p>
+          <a:p>
+            <a:pPr marL="171450" indent="-171450">
+              <a:buFontTx/>
+              <a:buChar char="-"/>
+            </a:pPr>
+            <a:r>
+              <a:rPr lang="da-DK" baseline="0" dirty="0" smtClean="0"/>
+              <a:t>Ændret til at alle opgaver </a:t>
+            </a:r>
+            <a:r>
+              <a:rPr lang="da-DK" b="1" baseline="0" dirty="0" err="1" smtClean="0"/>
+              <a:t>assignes</a:t>
+            </a:r>
+            <a:r>
+              <a:rPr lang="da-DK" b="1" baseline="0" dirty="0" smtClean="0"/>
+              <a:t> med det samme</a:t>
+            </a:r>
+            <a:r>
+              <a:rPr lang="da-DK" baseline="0" dirty="0" smtClean="0"/>
+              <a:t>. Bedre overblik over, hvor meget der mangler. Man fik typisk 1 </a:t>
+            </a:r>
+            <a:r>
+              <a:rPr lang="da-DK" baseline="0" dirty="0" err="1" smtClean="0"/>
+              <a:t>use</a:t>
+            </a:r>
+            <a:r>
+              <a:rPr lang="da-DK" baseline="0" dirty="0" smtClean="0"/>
+              <a:t> case – både model, </a:t>
+            </a:r>
+            <a:r>
+              <a:rPr lang="da-DK" baseline="0" dirty="0" err="1" smtClean="0"/>
+              <a:t>view</a:t>
+            </a:r>
+            <a:r>
+              <a:rPr lang="da-DK" baseline="0" dirty="0" smtClean="0"/>
+              <a:t> og controller. Lavere kobling mellem medlemmer.</a:t>
+            </a:r>
+          </a:p>
+          <a:p>
+            <a:endParaRPr lang="da-DK" baseline="0" dirty="0" smtClean="0"/>
+          </a:p>
+          <a:p>
+            <a:r>
+              <a:rPr lang="da-DK" baseline="0" dirty="0" smtClean="0"/>
+              <a:t>Vi har brugt </a:t>
+            </a:r>
+            <a:r>
+              <a:rPr lang="da-DK" b="1" baseline="0" dirty="0" smtClean="0"/>
+              <a:t>2 </a:t>
+            </a:r>
+            <a:r>
+              <a:rPr lang="da-DK" b="1" baseline="0" dirty="0" err="1" smtClean="0"/>
+              <a:t>git</a:t>
+            </a:r>
+            <a:r>
+              <a:rPr lang="da-DK" b="1" baseline="0" dirty="0" smtClean="0"/>
+              <a:t> </a:t>
+            </a:r>
+            <a:r>
+              <a:rPr lang="da-DK" b="1" baseline="0" dirty="0" err="1" smtClean="0"/>
+              <a:t>repositories</a:t>
+            </a:r>
+            <a:endParaRPr lang="da-DK" b="1" baseline="0" dirty="0" smtClean="0"/>
+          </a:p>
+          <a:p>
+            <a:pPr marL="171450" indent="-171450">
+              <a:buFontTx/>
+              <a:buChar char="-"/>
+            </a:pPr>
+            <a:r>
+              <a:rPr lang="da-DK" baseline="0" dirty="0" smtClean="0"/>
+              <a:t>1: Til rapport og dokumentation (som er skrevet i latex og egner sig godt til dette) samt diverse diagrammer lavet i bl.a. </a:t>
+            </a:r>
+            <a:r>
+              <a:rPr lang="da-DK" baseline="0" dirty="0" err="1" smtClean="0"/>
+              <a:t>StarUML</a:t>
+            </a:r>
+            <a:r>
+              <a:rPr lang="da-DK" baseline="0" dirty="0" smtClean="0"/>
+              <a:t> og Visio.</a:t>
+            </a:r>
+          </a:p>
+          <a:p>
+            <a:pPr marL="171450" indent="-171450">
+              <a:buFontTx/>
+              <a:buChar char="-"/>
+            </a:pPr>
+            <a:r>
+              <a:rPr lang="da-DK" baseline="0" dirty="0" smtClean="0"/>
+              <a:t>2: Kode </a:t>
+            </a:r>
+            <a:r>
+              <a:rPr lang="da-DK" baseline="0" dirty="0" err="1" smtClean="0"/>
+              <a:t>repository</a:t>
+            </a:r>
+            <a:r>
+              <a:rPr lang="da-DK" baseline="0" dirty="0" smtClean="0"/>
+              <a:t> hvor al projekt-koden står. Denne blev koblet til skolens </a:t>
+            </a:r>
+            <a:r>
+              <a:rPr lang="da-DK" baseline="0" dirty="0" err="1" smtClean="0"/>
+              <a:t>Jenkins</a:t>
+            </a:r>
+            <a:r>
+              <a:rPr lang="da-DK" baseline="0" dirty="0" smtClean="0"/>
+              <a:t> server, som både bygger og kører tests for os. </a:t>
+            </a:r>
+          </a:p>
+          <a:p>
+            <a:pPr marL="0" indent="0">
+              <a:buFontTx/>
+              <a:buNone/>
+            </a:pPr>
+            <a:r>
+              <a:rPr lang="da-DK" baseline="0" dirty="0" smtClean="0"/>
+              <a:t>Der var altså hele tiden øje på, om man ødelagde noget eksisterende funktionalitet, selvom man glemte at eksekvere projektets Unit Tests.</a:t>
+            </a:r>
+            <a:endParaRPr lang="da-DK" dirty="0" smtClean="0"/>
+          </a:p>
+          <a:p>
+            <a:endParaRPr lang="da-DK" dirty="0"/>
+          </a:p>
+        </p:txBody>
+      </p:sp>
+      <p:sp>
+        <p:nvSpPr>
+          <p:cNvPr id="4" name="Pladsholder til slidenummer 3"/>
+          <p:cNvSpPr>
+            <a:spLocks noGrp="1"/>
+          </p:cNvSpPr>
+          <p:nvPr>
+            <p:ph type="sldNum" sz="quarter" idx="10"/>
+          </p:nvPr>
+        </p:nvSpPr>
+        <p:spPr/>
+        <p:txBody>
+          <a:bodyPr/>
+          <a:lstStyle/>
+          <a:p>
+            <a:fld id="{3126B5D0-05C2-4D34-AE76-1997AB998A84}" type="slidenum">
+              <a:rPr lang="en-US" smtClean="0"/>
+              <a:t>10</a:t>
+            </a:fld>
+            <a:endParaRPr lang="en-US"/>
+          </a:p>
+        </p:txBody>
+      </p:sp>
+    </p:spTree>
+    <p:extLst>
+      <p:ext uri="{BB962C8B-B14F-4D97-AF65-F5344CB8AC3E}">
+        <p14:creationId xmlns:p14="http://schemas.microsoft.com/office/powerpoint/2010/main" val="1899618170"/>
+      </p:ext>
+    </p:extLst>
+  </p:cSld>
+  <p:clrMapOvr>
+    <a:masterClrMapping/>
+  </p:clrMapOvr>
+</p:notes>
+</file>
+
+<file path=ppt/notesSlides/notesSlide6.xml><?xml version="1.0" encoding="utf-8"?>
+<p:notes xmlns:a="http://schemas.openxmlformats.org/drawingml/2006/main" xmlns:r="http://schemas.openxmlformats.org/officeDocument/2006/relationships" xmlns:p="http://schemas.openxmlformats.org/presentationml/2006/main">
+  <p:cSld>
+    <p:spTree>
+      <p:nvGrpSpPr>
+        <p:cNvPr id="1" name=""/>
+        <p:cNvGrpSpPr/>
+        <p:nvPr/>
+      </p:nvGrpSpPr>
+      <p:grpSpPr>
+        <a:xfrm>
+          <a:off x="0" y="0"/>
+          <a:ext cx="0" cy="0"/>
+          <a:chOff x="0" y="0"/>
+          <a:chExt cx="0" cy="0"/>
+        </a:xfrm>
+      </p:grpSpPr>
+      <p:sp>
+        <p:nvSpPr>
+          <p:cNvPr id="2" name="Pladsholder til slidebillede 1"/>
+          <p:cNvSpPr>
+            <a:spLocks noGrp="1" noRot="1" noChangeAspect="1"/>
+          </p:cNvSpPr>
+          <p:nvPr>
+            <p:ph type="sldImg"/>
+          </p:nvPr>
+        </p:nvSpPr>
+        <p:spPr/>
+      </p:sp>
+      <p:sp>
+        <p:nvSpPr>
+          <p:cNvPr id="3" name="Pladsholder til noter 2"/>
+          <p:cNvSpPr>
+            <a:spLocks noGrp="1"/>
+          </p:cNvSpPr>
+          <p:nvPr>
+            <p:ph type="body" idx="1"/>
+          </p:nvPr>
+        </p:nvSpPr>
+        <p:spPr/>
+        <p:txBody>
+          <a:bodyPr/>
+          <a:lstStyle/>
+          <a:p>
+            <a:r>
+              <a:rPr lang="da-DK" dirty="0" smtClean="0"/>
               <a:t>Opret en bruger</a:t>
             </a:r>
           </a:p>
@@ -1278,7 +1562,7 @@
           <a:p>
             <a:fld id="{DAAE9EB6-D99F-4040-9B6D-D69985B76708}" type="datetimeFigureOut">
               <a:rPr lang="en-US" smtClean="0"/>
-              <a:t>29-Jun-15</a:t>
+              <a:t>6/29/2015</a:t>
             </a:fld>
             <a:endParaRPr lang="en-US"/>
           </a:p>
@@ -1486,7 +1770,7 @@
           <a:p>
             <a:fld id="{DAAE9EB6-D99F-4040-9B6D-D69985B76708}" type="datetimeFigureOut">
               <a:rPr lang="en-US" smtClean="0"/>
-              <a:t>29-Jun-15</a:t>
+              <a:t>6/29/2015</a:t>
             </a:fld>
             <a:endParaRPr lang="en-US"/>
           </a:p>
@@ -1742,7 +2026,7 @@
           <a:p>
             <a:fld id="{DAAE9EB6-D99F-4040-9B6D-D69985B76708}" type="datetimeFigureOut">
               <a:rPr lang="en-US" smtClean="0"/>
-              <a:t>29-Jun-15</a:t>
+              <a:t>6/29/2015</a:t>
             </a:fld>
             <a:endParaRPr lang="en-US"/>
           </a:p>
@@ -1912,7 +2196,7 @@
           <a:p>
             <a:fld id="{DAAE9EB6-D99F-4040-9B6D-D69985B76708}" type="datetimeFigureOut">
               <a:rPr lang="en-US" smtClean="0"/>
-              <a:t>29-Jun-15</a:t>
+              <a:t>6/29/2015</a:t>
             </a:fld>
             <a:endParaRPr lang="en-US"/>
           </a:p>
@@ -2255,7 +2539,7 @@
           <a:p>
             <a:fld id="{DAAE9EB6-D99F-4040-9B6D-D69985B76708}" type="datetimeFigureOut">
               <a:rPr lang="en-US" smtClean="0"/>
-              <a:t>29-Jun-15</a:t>
+              <a:t>6/29/2015</a:t>
             </a:fld>
             <a:endParaRPr lang="en-US"/>
           </a:p>
@@ -2530,7 +2814,7 @@
           <a:p>
             <a:fld id="{DAAE9EB6-D99F-4040-9B6D-D69985B76708}" type="datetimeFigureOut">
               <a:rPr lang="en-US" smtClean="0"/>
-              <a:t>29-Jun-15</a:t>
+              <a:t>6/29/2015</a:t>
             </a:fld>
             <a:endParaRPr lang="en-US"/>
           </a:p>
@@ -2909,7 +3193,7 @@
           <a:p>
             <a:fld id="{DAAE9EB6-D99F-4040-9B6D-D69985B76708}" type="datetimeFigureOut">
               <a:rPr lang="en-US" smtClean="0"/>
-              <a:t>29-Jun-15</a:t>
+              <a:t>6/29/2015</a:t>
             </a:fld>
             <a:endParaRPr lang="en-US"/>
           </a:p>
@@ -3027,7 +3311,7 @@
           <a:p>
             <a:fld id="{DAAE9EB6-D99F-4040-9B6D-D69985B76708}" type="datetimeFigureOut">
               <a:rPr lang="en-US" smtClean="0"/>
-              <a:t>29-Jun-15</a:t>
+              <a:t>6/29/2015</a:t>
             </a:fld>
             <a:endParaRPr lang="en-US"/>
           </a:p>
@@ -3198,7 +3482,7 @@
           <a:p>
             <a:fld id="{DAAE9EB6-D99F-4040-9B6D-D69985B76708}" type="datetimeFigureOut">
               <a:rPr lang="en-US" smtClean="0"/>
-              <a:t>29-Jun-15</a:t>
+              <a:t>6/29/2015</a:t>
             </a:fld>
             <a:endParaRPr lang="en-US"/>
           </a:p>
@@ -3552,7 +3836,7 @@
           <a:p>
             <a:fld id="{DAAE9EB6-D99F-4040-9B6D-D69985B76708}" type="datetimeFigureOut">
               <a:rPr lang="en-US" smtClean="0"/>
-              <a:t>29-Jun-15</a:t>
+              <a:t>6/29/2015</a:t>
             </a:fld>
             <a:endParaRPr lang="en-US"/>
           </a:p>
@@ -3929,7 +4213,7 @@
           <a:p>
             <a:fld id="{DAAE9EB6-D99F-4040-9B6D-D69985B76708}" type="datetimeFigureOut">
               <a:rPr lang="en-US" smtClean="0"/>
-              <a:t>29-Jun-15</a:t>
+              <a:t>6/29/2015</a:t>
             </a:fld>
             <a:endParaRPr lang="en-US"/>
           </a:p>
@@ -4216,7 +4500,7 @@
           <a:p>
             <a:fld id="{DAAE9EB6-D99F-4040-9B6D-D69985B76708}" type="datetimeFigureOut">
               <a:rPr lang="en-US" smtClean="0"/>
-              <a:t>29-Jun-15</a:t>
+              <a:t>6/29/2015</a:t>
             </a:fld>
             <a:endParaRPr lang="en-US"/>
           </a:p>
@@ -4888,14 +5172,6 @@
             </a:r>
             <a:endParaRPr lang="da-DK" dirty="0" smtClean="0"/>
           </a:p>
-          <a:p>
-            <a:pPr lvl="1"/>
-            <a:r>
-              <a:rPr lang="da-DK" dirty="0" err="1" smtClean="0"/>
-              <a:t>Doxygen</a:t>
-            </a:r>
-            <a:endParaRPr lang="da-DK" dirty="0" smtClean="0"/>
-          </a:p>
         </p:txBody>
       </p:sp>
       <p:sp>
@@ -4928,6 +5204,63 @@
           </a:p>
         </p:txBody>
       </p:sp>
+      <p:graphicFrame>
+        <p:nvGraphicFramePr>
+          <p:cNvPr id="5" name="Objekt 4"/>
+          <p:cNvGraphicFramePr>
+            <a:graphicFrameLocks noChangeAspect="1"/>
+          </p:cNvGraphicFramePr>
+          <p:nvPr>
+            <p:extLst>
+              <p:ext uri="{D42A27DB-BD31-4B8C-83A1-F6EECF244321}">
+                <p14:modId xmlns:p14="http://schemas.microsoft.com/office/powerpoint/2010/main" val="482579545"/>
+              </p:ext>
+            </p:extLst>
+          </p:nvPr>
+        </p:nvGraphicFramePr>
+        <p:xfrm>
+          <a:off x="4638151" y="2735097"/>
+          <a:ext cx="6517529" cy="3411349"/>
+        </p:xfrm>
+        <a:graphic>
+          <a:graphicData uri="http://schemas.openxmlformats.org/presentationml/2006/ole">
+            <mc:AlternateContent xmlns:mc="http://schemas.openxmlformats.org/markup-compatibility/2006">
+              <mc:Choice xmlns:v="urn:schemas-microsoft-com:vml" Requires="v">
+                <p:oleObj spid="_x0000_s1026" name="Bitmap Image" r:id="rId4" imgW="5695920" imgH="2981160" progId="Paint.Picture">
+                  <p:embed/>
+                </p:oleObj>
+              </mc:Choice>
+              <mc:Fallback>
+                <p:oleObj name="Bitmap Image" r:id="rId4" imgW="5695920" imgH="2981160" progId="Paint.Picture">
+                  <p:embed/>
+                  <p:pic>
+                    <p:nvPicPr>
+                      <p:cNvPr id="0" name=""/>
+                      <p:cNvPicPr/>
+                      <p:nvPr/>
+                    </p:nvPicPr>
+                    <p:blipFill>
+                      <a:blip r:embed="rId5"/>
+                      <a:stretch>
+                        <a:fillRect/>
+                      </a:stretch>
+                    </p:blipFill>
+                    <p:spPr>
+                      <a:xfrm>
+                        <a:off x="4638151" y="2735097"/>
+                        <a:ext cx="6517529" cy="3411349"/>
+                      </a:xfrm>
+                      <a:prstGeom prst="rect">
+                        <a:avLst/>
+                      </a:prstGeom>
+                    </p:spPr>
+                  </p:pic>
+                </p:oleObj>
+              </mc:Fallback>
+            </mc:AlternateContent>
+          </a:graphicData>
+        </a:graphic>
+      </p:graphicFrame>
     </p:spTree>
     <p:extLst>
       <p:ext uri="{BB962C8B-B14F-4D97-AF65-F5344CB8AC3E}">

</xml_diff>